<commit_message>
Update Laygo2 cheatsheet to version 0.2
</commit_message>
<xml_diff>
--- a/docs_workspace/docs_sphinx/assets/misc/laygo2_cheatsheet.pptx
+++ b/docs_workspace/docs_sphinx/assets/misc/laygo2_cheatsheet.pptx
@@ -251,7 +251,7 @@
           <a:p>
             <a:fld id="{6A47FB86-A802-4FA4-9B5F-625163A45DA5}" type="datetimeFigureOut">
               <a:rPr lang="ko-KR" altLang="en-US" smtClean="0"/>
-              <a:t>2023-02-09</a:t>
+              <a:t>2024-10-09</a:t>
             </a:fld>
             <a:endParaRPr lang="ko-KR" altLang="en-US"/>
           </a:p>
@@ -421,7 +421,7 @@
           <a:p>
             <a:fld id="{6A47FB86-A802-4FA4-9B5F-625163A45DA5}" type="datetimeFigureOut">
               <a:rPr lang="ko-KR" altLang="en-US" smtClean="0"/>
-              <a:t>2023-02-09</a:t>
+              <a:t>2024-10-09</a:t>
             </a:fld>
             <a:endParaRPr lang="ko-KR" altLang="en-US"/>
           </a:p>
@@ -601,7 +601,7 @@
           <a:p>
             <a:fld id="{6A47FB86-A802-4FA4-9B5F-625163A45DA5}" type="datetimeFigureOut">
               <a:rPr lang="ko-KR" altLang="en-US" smtClean="0"/>
-              <a:t>2023-02-09</a:t>
+              <a:t>2024-10-09</a:t>
             </a:fld>
             <a:endParaRPr lang="ko-KR" altLang="en-US"/>
           </a:p>
@@ -771,7 +771,7 @@
           <a:p>
             <a:fld id="{6A47FB86-A802-4FA4-9B5F-625163A45DA5}" type="datetimeFigureOut">
               <a:rPr lang="ko-KR" altLang="en-US" smtClean="0"/>
-              <a:t>2023-02-09</a:t>
+              <a:t>2024-10-09</a:t>
             </a:fld>
             <a:endParaRPr lang="ko-KR" altLang="en-US"/>
           </a:p>
@@ -1015,7 +1015,7 @@
           <a:p>
             <a:fld id="{6A47FB86-A802-4FA4-9B5F-625163A45DA5}" type="datetimeFigureOut">
               <a:rPr lang="ko-KR" altLang="en-US" smtClean="0"/>
-              <a:t>2023-02-09</a:t>
+              <a:t>2024-10-09</a:t>
             </a:fld>
             <a:endParaRPr lang="ko-KR" altLang="en-US"/>
           </a:p>
@@ -1247,7 +1247,7 @@
           <a:p>
             <a:fld id="{6A47FB86-A802-4FA4-9B5F-625163A45DA5}" type="datetimeFigureOut">
               <a:rPr lang="ko-KR" altLang="en-US" smtClean="0"/>
-              <a:t>2023-02-09</a:t>
+              <a:t>2024-10-09</a:t>
             </a:fld>
             <a:endParaRPr lang="ko-KR" altLang="en-US"/>
           </a:p>
@@ -1614,7 +1614,7 @@
           <a:p>
             <a:fld id="{6A47FB86-A802-4FA4-9B5F-625163A45DA5}" type="datetimeFigureOut">
               <a:rPr lang="ko-KR" altLang="en-US" smtClean="0"/>
-              <a:t>2023-02-09</a:t>
+              <a:t>2024-10-09</a:t>
             </a:fld>
             <a:endParaRPr lang="ko-KR" altLang="en-US"/>
           </a:p>
@@ -1732,7 +1732,7 @@
           <a:p>
             <a:fld id="{6A47FB86-A802-4FA4-9B5F-625163A45DA5}" type="datetimeFigureOut">
               <a:rPr lang="ko-KR" altLang="en-US" smtClean="0"/>
-              <a:t>2023-02-09</a:t>
+              <a:t>2024-10-09</a:t>
             </a:fld>
             <a:endParaRPr lang="ko-KR" altLang="en-US"/>
           </a:p>
@@ -1827,7 +1827,7 @@
           <a:p>
             <a:fld id="{6A47FB86-A802-4FA4-9B5F-625163A45DA5}" type="datetimeFigureOut">
               <a:rPr lang="ko-KR" altLang="en-US" smtClean="0"/>
-              <a:t>2023-02-09</a:t>
+              <a:t>2024-10-09</a:t>
             </a:fld>
             <a:endParaRPr lang="ko-KR" altLang="en-US"/>
           </a:p>
@@ -2104,7 +2104,7 @@
           <a:p>
             <a:fld id="{6A47FB86-A802-4FA4-9B5F-625163A45DA5}" type="datetimeFigureOut">
               <a:rPr lang="ko-KR" altLang="en-US" smtClean="0"/>
-              <a:t>2023-02-09</a:t>
+              <a:t>2024-10-09</a:t>
             </a:fld>
             <a:endParaRPr lang="ko-KR" altLang="en-US"/>
           </a:p>
@@ -2361,7 +2361,7 @@
           <a:p>
             <a:fld id="{6A47FB86-A802-4FA4-9B5F-625163A45DA5}" type="datetimeFigureOut">
               <a:rPr lang="ko-KR" altLang="en-US" smtClean="0"/>
-              <a:t>2023-02-09</a:t>
+              <a:t>2024-10-09</a:t>
             </a:fld>
             <a:endParaRPr lang="ko-KR" altLang="en-US"/>
           </a:p>
@@ -2574,7 +2574,7 @@
           <a:p>
             <a:fld id="{6A47FB86-A802-4FA4-9B5F-625163A45DA5}" type="datetimeFigureOut">
               <a:rPr lang="ko-KR" altLang="en-US" smtClean="0"/>
-              <a:t>2023-02-09</a:t>
+              <a:t>2024-10-09</a:t>
             </a:fld>
             <a:endParaRPr lang="ko-KR" altLang="en-US"/>
           </a:p>
@@ -2994,7 +2994,7 @@
         <p:spPr>
           <a:xfrm>
             <a:off x="0" y="0"/>
-            <a:ext cx="6858000" cy="7417415"/>
+            <a:ext cx="6858000" cy="7571303"/>
           </a:xfrm>
           <a:prstGeom prst="rect">
             <a:avLst/>
@@ -3038,7 +3038,7 @@
                 <a:ea typeface="Calibri" panose="020F0502020204030204" pitchFamily="34" charset="0"/>
                 <a:cs typeface="Calibri" panose="020F0502020204030204" pitchFamily="34" charset="0"/>
               </a:rPr>
-              <a:t> 0.1</a:t>
+              <a:t> 0.2</a:t>
             </a:r>
           </a:p>
           <a:p>
@@ -3839,11 +3839,25 @@
               <a:t>=</a:t>
             </a:r>
             <a:r>
-              <a:rPr lang="en-US" altLang="ko-KR" sz="1000" dirty="0" err="1">
-                <a:latin typeface="Courier New" panose="02070309020205020404" pitchFamily="49" charset="0"/>
-                <a:cs typeface="Courier New" panose="02070309020205020404" pitchFamily="49" charset="0"/>
-              </a:rPr>
-              <a:t>pg.mn.top_left</a:t>
+              <a:rPr lang="en-US" altLang="ko-KR" sz="1000" err="1">
+                <a:latin typeface="Courier New" panose="02070309020205020404" pitchFamily="49" charset="0"/>
+                <a:cs typeface="Courier New" panose="02070309020205020404" pitchFamily="49" charset="0"/>
+              </a:rPr>
+              <a:t>pg</a:t>
+            </a:r>
+            <a:r>
+              <a:rPr lang="en-US" altLang="ko-KR" sz="1000">
+                <a:latin typeface="Courier New" panose="02070309020205020404" pitchFamily="49" charset="0"/>
+                <a:cs typeface="Courier New" panose="02070309020205020404" pitchFamily="49" charset="0"/>
+              </a:rPr>
+              <a:t>.top</a:t>
+            </a:r>
+            <a:r>
+              <a:rPr lang="en-US" altLang="ko-KR" sz="1000" dirty="0" err="1">
+                <a:latin typeface="Courier New" panose="02070309020205020404" pitchFamily="49" charset="0"/>
+                <a:cs typeface="Courier New" panose="02070309020205020404" pitchFamily="49" charset="0"/>
+              </a:rPr>
+              <a:t>_left</a:t>
             </a:r>
             <a:r>
               <a:rPr lang="en-US" altLang="ko-KR" sz="1000" dirty="0">
@@ -3929,7 +3943,21 @@
                 <a:latin typeface="Courier New" panose="02070309020205020404" pitchFamily="49" charset="0"/>
                 <a:cs typeface="Courier New" panose="02070309020205020404" pitchFamily="49" charset="0"/>
               </a:rPr>
-              <a:t>=[[0, 1], rg.mn(</a:t>
+              <a:t>=[[0, 1], </a:t>
+            </a:r>
+            <a:r>
+              <a:rPr lang="en-US" altLang="ko-KR" sz="1000" dirty="0" err="1">
+                <a:latin typeface="Courier New" panose="02070309020205020404" pitchFamily="49" charset="0"/>
+                <a:cs typeface="Courier New" panose="02070309020205020404" pitchFamily="49" charset="0"/>
+              </a:rPr>
+              <a:t>rg</a:t>
+            </a:r>
+            <a:r>
+              <a:rPr lang="en-US" altLang="ko-KR" sz="1000" dirty="0">
+                <a:latin typeface="Courier New" panose="02070309020205020404" pitchFamily="49" charset="0"/>
+                <a:cs typeface="Courier New" panose="02070309020205020404" pitchFamily="49" charset="0"/>
+              </a:rPr>
+              <a:t>(</a:t>
             </a:r>
             <a:r>
               <a:rPr lang="en-US" altLang="ko-KR" sz="1000" dirty="0" err="1">
@@ -4004,7 +4032,21 @@
                 <a:latin typeface="Courier New" panose="02070309020205020404" pitchFamily="49" charset="0"/>
                 <a:cs typeface="Courier New" panose="02070309020205020404" pitchFamily="49" charset="0"/>
               </a:rPr>
-              <a:t>=rg.mn(</a:t>
+              <a:t>=</a:t>
+            </a:r>
+            <a:r>
+              <a:rPr lang="en-US" altLang="ko-KR" sz="1000" dirty="0" err="1">
+                <a:latin typeface="Courier New" panose="02070309020205020404" pitchFamily="49" charset="0"/>
+                <a:cs typeface="Courier New" panose="02070309020205020404" pitchFamily="49" charset="0"/>
+              </a:rPr>
+              <a:t>rg</a:t>
+            </a:r>
+            <a:r>
+              <a:rPr lang="en-US" altLang="ko-KR" sz="1000" dirty="0">
+                <a:latin typeface="Courier New" panose="02070309020205020404" pitchFamily="49" charset="0"/>
+                <a:cs typeface="Courier New" panose="02070309020205020404" pitchFamily="49" charset="0"/>
+              </a:rPr>
+              <a:t>(</a:t>
             </a:r>
             <a:r>
               <a:rPr lang="en-US" altLang="ko-KR" sz="1000" dirty="0" err="1">
@@ -4189,8 +4231,14 @@
                 <a:latin typeface="Courier New" panose="02070309020205020404" pitchFamily="49" charset="0"/>
                 <a:cs typeface="Courier New" panose="02070309020205020404" pitchFamily="49" charset="0"/>
               </a:rPr>
-              <a:t>, colormap, order, filename) </a:t>
-            </a:r>
+              <a:t>, colormap, order, filename, show=True) </a:t>
+            </a:r>
+            <a:br>
+              <a:rPr lang="en-US" altLang="ko-KR" sz="1000" dirty="0">
+                <a:latin typeface="Courier New" panose="02070309020205020404" pitchFamily="49" charset="0"/>
+                <a:cs typeface="Courier New" panose="02070309020205020404" pitchFamily="49" charset="0"/>
+              </a:rPr>
+            </a:br>
             <a:r>
               <a:rPr lang="en-US" altLang="ko-KR" sz="1000" dirty="0">
                 <a:solidFill>

</xml_diff>